<commit_message>
updating all lectures and testing symlinking for url to current lectures
</commit_message>
<xml_diff>
--- a/assets/lectures/cshl/2018/RNASeq_Module1_Lecture.pptx
+++ b/assets/lectures/cshl/2018/RNASeq_Module1_Lecture.pptx
@@ -288,7 +288,7 @@
               <a:pPr>
                 <a:defRPr/>
               </a:pPr>
-              <a:t>11/12/18</a:t>
+              <a:t>11/13/18</a:t>
             </a:fld>
             <a:endParaRPr lang="en-US"/>
           </a:p>
@@ -495,7 +495,7 @@
               <a:pPr>
                 <a:defRPr/>
               </a:pPr>
-              <a:t>11/12/18</a:t>
+              <a:t>11/13/18</a:t>
             </a:fld>
             <a:endParaRPr lang="en-US"/>
           </a:p>
@@ -6925,7 +6925,7 @@
               <a:pPr>
                 <a:defRPr/>
               </a:pPr>
-              <a:t>11/12/18</a:t>
+              <a:t>11/13/18</a:t>
             </a:fld>
             <a:endParaRPr lang="en-US"/>
           </a:p>
@@ -10435,12 +10435,47 @@
               <a:defRPr/>
             </a:pPr>
             <a:r>
-              <a:rPr lang="en-US" sz="1600" dirty="0" smtClean="0">
+              <a:rPr lang="en-US" sz="1600" dirty="0" err="1">
                 <a:latin typeface="Calibri"/>
-                <a:ea typeface="+mj-ea"/>
                 <a:cs typeface="Calibri"/>
               </a:rPr>
-              <a:t>Malachi Griffith, Obi Griffith, Jason Walker, Alex Wagner</a:t>
+              <a:t>Kelsy</a:t>
+            </a:r>
+            <a:r>
+              <a:rPr lang="en-US" sz="1600" dirty="0">
+                <a:latin typeface="Calibri"/>
+                <a:cs typeface="Calibri"/>
+              </a:rPr>
+              <a:t> </a:t>
+            </a:r>
+            <a:r>
+              <a:rPr lang="en-US" sz="1600" dirty="0" err="1">
+                <a:latin typeface="Calibri"/>
+                <a:cs typeface="Calibri"/>
+              </a:rPr>
+              <a:t>Cotto</a:t>
+            </a:r>
+            <a:r>
+              <a:rPr lang="en-US" sz="1600" dirty="0">
+                <a:latin typeface="Calibri"/>
+                <a:cs typeface="Calibri"/>
+              </a:rPr>
+              <a:t>, Obi Griffith, Malachi Griffith, </a:t>
+            </a:r>
+          </a:p>
+          <a:p>
+            <a:pPr fontAlgn="auto">
+              <a:spcAft>
+                <a:spcPts val="0"/>
+              </a:spcAft>
+              <a:defRPr/>
+            </a:pPr>
+            <a:r>
+              <a:rPr lang="en-US" sz="1600" dirty="0">
+                <a:latin typeface="Calibri"/>
+                <a:cs typeface="Calibri"/>
+              </a:rPr>
+              <a:t>Alex Wagner, Jason Walker</a:t>
             </a:r>
           </a:p>
           <a:p>
@@ -10484,87 +10519,11 @@
                   </a:solidFill>
                 </a:ln>
                 <a:latin typeface="Calibri"/>
-                <a:ea typeface="+mn-ea"/>
                 <a:cs typeface="Calibri"/>
               </a:rPr>
-              <a:t>November </a:t>
-            </a:r>
-            <a:r>
-              <a:rPr lang="en-US" sz="1400" dirty="0" smtClean="0">
-                <a:ln w="1270">
-                  <a:solidFill>
-                    <a:schemeClr val="tx1">
-                      <a:alpha val="38000"/>
-                    </a:schemeClr>
-                  </a:solidFill>
-                </a:ln>
-                <a:latin typeface="Calibri"/>
-                <a:ea typeface="+mn-ea"/>
-                <a:cs typeface="Calibri"/>
-              </a:rPr>
-              <a:t>5 </a:t>
-            </a:r>
-            <a:r>
-              <a:rPr lang="en-US" sz="1400" dirty="0" smtClean="0">
-                <a:ln w="1270">
-                  <a:solidFill>
-                    <a:schemeClr val="tx1">
-                      <a:alpha val="38000"/>
-                    </a:schemeClr>
-                  </a:solidFill>
-                </a:ln>
-                <a:latin typeface="Calibri"/>
-                <a:ea typeface="+mn-ea"/>
-                <a:cs typeface="Calibri"/>
-              </a:rPr>
-              <a:t> </a:t>
-            </a:r>
-            <a:r>
-              <a:rPr lang="en-US" sz="1400" dirty="0">
-                <a:ln w="1270">
-                  <a:solidFill>
-                    <a:schemeClr val="tx1">
-                      <a:alpha val="38000"/>
-                    </a:schemeClr>
-                  </a:solidFill>
-                </a:ln>
-                <a:latin typeface="Calibri"/>
-                <a:ea typeface="+mn-ea"/>
-                <a:cs typeface="Calibri"/>
-              </a:rPr>
-              <a:t>- </a:t>
-            </a:r>
-            <a:r>
-              <a:rPr lang="en-US" sz="1400" dirty="0" smtClean="0">
-                <a:ln w="1270">
-                  <a:solidFill>
-                    <a:schemeClr val="tx1">
-                      <a:alpha val="38000"/>
-                    </a:schemeClr>
-                  </a:solidFill>
-                </a:ln>
-                <a:latin typeface="Calibri"/>
-                <a:ea typeface="+mn-ea"/>
-                <a:cs typeface="Calibri"/>
-              </a:rPr>
-              <a:t>18, </a:t>
-            </a:r>
-            <a:r>
-              <a:rPr lang="en-US" sz="1400" dirty="0" smtClean="0">
-                <a:ln w="1270">
-                  <a:solidFill>
-                    <a:schemeClr val="tx1">
-                      <a:alpha val="38000"/>
-                    </a:schemeClr>
-                  </a:solidFill>
-                </a:ln>
-                <a:latin typeface="Calibri"/>
-                <a:ea typeface="+mn-ea"/>
-                <a:cs typeface="Calibri"/>
-              </a:rPr>
-              <a:t>2018</a:t>
-            </a:r>
-            <a:endParaRPr lang="en-US" sz="1400" dirty="0" smtClean="0">
+              <a:t>November 6- 18, 2018</a:t>
+            </a:r>
+            <a:endParaRPr lang="en-US" sz="1400" dirty="0">
               <a:ln w="1270">
                 <a:solidFill>
                   <a:schemeClr val="tx1">
@@ -10573,7 +10532,6 @@
                 </a:solidFill>
               </a:ln>
               <a:latin typeface="Calibri"/>
-              <a:ea typeface="+mn-ea"/>
               <a:cs typeface="Calibri"/>
             </a:endParaRPr>
           </a:p>

</xml_diff>

<commit_message>
update lectures and overview image
</commit_message>
<xml_diff>
--- a/assets/lectures/cshl/2018/RNASeq_Module1_Lecture.pptx
+++ b/assets/lectures/cshl/2018/RNASeq_Module1_Lecture.pptx
@@ -13,7 +13,7 @@
   <p:sldIdLst>
     <p:sldId id="341" r:id="rId2"/>
     <p:sldId id="513" r:id="rId3"/>
-    <p:sldId id="514" r:id="rId4"/>
+    <p:sldId id="539" r:id="rId4"/>
     <p:sldId id="515" r:id="rId5"/>
     <p:sldId id="516" r:id="rId6"/>
     <p:sldId id="517" r:id="rId7"/>
@@ -168,7 +168,7 @@
   </p:defaultTextStyle>
   <p:extLst>
     <p:ext uri="{EFAFB233-063F-42B5-8137-9DF3F51BA10A}">
-      <p15:sldGuideLst xmlns="" xmlns:p15="http://schemas.microsoft.com/office/powerpoint/2012/main">
+      <p15:sldGuideLst xmlns:p15="http://schemas.microsoft.com/office/powerpoint/2012/main" xmlns="">
         <p15:guide id="1" orient="horz" pos="2160">
           <p15:clr>
             <a:srgbClr val="A4A3A4"/>
@@ -288,7 +288,7 @@
               <a:pPr>
                 <a:defRPr/>
               </a:pPr>
-              <a:t>11/13/18</a:t>
+              <a:t>11/14/18</a:t>
             </a:fld>
             <a:endParaRPr lang="en-US"/>
           </a:p>
@@ -495,7 +495,7 @@
               <a:pPr>
                 <a:defRPr/>
               </a:pPr>
-              <a:t>11/13/18</a:t>
+              <a:t>11/14/18</a:t>
             </a:fld>
             <a:endParaRPr lang="en-US"/>
           </a:p>
@@ -6925,7 +6925,7 @@
               <a:pPr>
                 <a:defRPr/>
               </a:pPr>
-              <a:t>11/13/18</a:t>
+              <a:t>11/14/18</a:t>
             </a:fld>
             <a:endParaRPr lang="en-US"/>
           </a:p>
@@ -10523,17 +10523,6 @@
               </a:rPr>
               <a:t>November 6- 18, 2018</a:t>
             </a:r>
-            <a:endParaRPr lang="en-US" sz="1400" dirty="0">
-              <a:ln w="1270">
-                <a:solidFill>
-                  <a:schemeClr val="tx1">
-                    <a:alpha val="38000"/>
-                  </a:schemeClr>
-                </a:solidFill>
-              </a:ln>
-              <a:latin typeface="Calibri"/>
-              <a:cs typeface="Calibri"/>
-            </a:endParaRPr>
           </a:p>
         </p:txBody>
       </p:sp>
@@ -11928,7 +11917,7 @@
               <a:buNone/>
             </a:pPr>
             <a:r>
-              <a:rPr lang="en-US" sz="4400">
+              <a:rPr lang="en-US" sz="4400" dirty="0">
                 <a:latin typeface="Calibri" charset="0"/>
                 <a:ea typeface="ＭＳ Ｐゴシック" charset="0"/>
               </a:rPr>
@@ -11995,7 +11984,7 @@
           <a:lstStyle/>
           <a:p>
             <a:r>
-              <a:rPr lang="en-US">
+              <a:rPr lang="en-US" dirty="0">
                 <a:latin typeface="Calibri" charset="0"/>
                 <a:ea typeface="ＭＳ Ｐゴシック" charset="0"/>
               </a:rPr>
@@ -12014,10 +12003,15 @@
             <p:ph idx="1"/>
           </p:nvPr>
         </p:nvSpPr>
-        <p:spPr/>
+        <p:spPr>
+          <a:xfrm>
+            <a:off x="152400" y="1584920"/>
+            <a:ext cx="8839200" cy="4724400"/>
+          </a:xfrm>
+        </p:spPr>
         <p:txBody>
           <a:bodyPr>
-            <a:normAutofit lnSpcReduction="10000"/>
+            <a:normAutofit fontScale="92500" lnSpcReduction="10000"/>
           </a:bodyPr>
           <a:lstStyle/>
           <a:p>
@@ -12026,7 +12020,11 @@
             </a:pPr>
             <a:r>
               <a:rPr lang="en-US" b="1" dirty="0" smtClean="0"/>
-              <a:t>Module 1: </a:t>
+              <a:t>Module </a:t>
+            </a:r>
+            <a:r>
+              <a:rPr lang="en-US" b="1" dirty="0" smtClean="0"/>
+              <a:t>1: </a:t>
             </a:r>
             <a:r>
               <a:rPr lang="en-US" b="1" dirty="0"/>
@@ -12082,7 +12080,11 @@
             </a:r>
             <a:r>
               <a:rPr lang="en-US" dirty="0"/>
-              <a:t>Expression and Differential Expression</a:t>
+              <a:t>Expression and Differential </a:t>
+            </a:r>
+            <a:r>
+              <a:rPr lang="en-US" dirty="0" smtClean="0"/>
+              <a:t>Expression</a:t>
             </a:r>
           </a:p>
           <a:p>
@@ -12090,12 +12092,22 @@
               <a:defRPr/>
             </a:pPr>
             <a:r>
+              <a:rPr lang="en-US" dirty="0" smtClean="0"/>
+              <a:t>Module 4: Alignment Free Expression Estimation</a:t>
+            </a:r>
+            <a:endParaRPr lang="en-US" dirty="0"/>
+          </a:p>
+          <a:p>
+            <a:pPr>
+              <a:defRPr/>
+            </a:pPr>
+            <a:r>
               <a:rPr lang="en-US" dirty="0"/>
-              <a:t>Module </a:t>
+              <a:t>Module 5</a:t>
             </a:r>
             <a:r>
               <a:rPr lang="en-US" dirty="0" smtClean="0"/>
-              <a:t>4: </a:t>
+              <a:t>: </a:t>
             </a:r>
             <a:r>
               <a:rPr lang="en-US" dirty="0"/>
@@ -12255,7 +12267,7 @@
     </p:spTree>
     <p:extLst>
       <p:ext uri="{BB962C8B-B14F-4D97-AF65-F5344CB8AC3E}">
-        <p14:creationId xmlns:p14="http://schemas.microsoft.com/office/powerpoint/2010/main" val="3494706342"/>
+        <p14:creationId xmlns:p14="http://schemas.microsoft.com/office/powerpoint/2010/main" val="1675791056"/>
       </p:ext>
     </p:extLst>
   </p:cSld>

</xml_diff>